<commit_message>
Clase de Smarty + Orden en el repo
</commit_message>
<xml_diff>
--- a/Clases/Javascript/Slides/Javascript.pptx
+++ b/Clases/Javascript/Slides/Javascript.pptx
@@ -521,11 +521,53 @@
           <a:p>
             <a:r>
               <a:rPr lang="en-US" dirty="0" err="1" smtClean="0"/>
+              <a:t>Modalidad</a:t>
+            </a:r>
+            <a:r>
+              <a:rPr lang="en-US" dirty="0" smtClean="0"/>
+              <a:t> de la material:</a:t>
+            </a:r>
+          </a:p>
+          <a:p>
+            <a:r>
+              <a:rPr lang="en-US" dirty="0" smtClean="0"/>
+              <a:t>Repo</a:t>
+            </a:r>
+            <a:r>
+              <a:rPr lang="en-US" baseline="0" dirty="0" smtClean="0"/>
+              <a:t> de </a:t>
+            </a:r>
+            <a:r>
+              <a:rPr lang="en-US" baseline="0" dirty="0" err="1" smtClean="0"/>
+              <a:t>Git</a:t>
+            </a:r>
+            <a:endParaRPr lang="en-US" baseline="0" dirty="0" smtClean="0"/>
+          </a:p>
+          <a:p>
+            <a:r>
+              <a:rPr lang="en-US" baseline="0" dirty="0" err="1" smtClean="0"/>
+              <a:t>Distrubution</a:t>
+            </a:r>
+            <a:r>
+              <a:rPr lang="en-US" baseline="0" smtClean="0"/>
+              <a:t> List</a:t>
+            </a:r>
+          </a:p>
+          <a:p>
+            <a:endParaRPr lang="en-US" smtClean="0"/>
+          </a:p>
+          <a:p>
+            <a:r>
+              <a:rPr lang="en-US" dirty="0" err="1" smtClean="0"/>
               <a:t>Explicar</a:t>
             </a:r>
             <a:r>
               <a:rPr lang="en-US" dirty="0" smtClean="0"/>
-              <a:t> la</a:t>
+              <a:t> </a:t>
+            </a:r>
+            <a:r>
+              <a:rPr lang="en-US" dirty="0" smtClean="0"/>
+              <a:t>la</a:t>
             </a:r>
             <a:r>
               <a:rPr lang="en-US" baseline="0" dirty="0" smtClean="0"/>
@@ -23128,11 +23170,7 @@
           <a:p>
             <a:r>
               <a:rPr lang="en-US" sz="1800" dirty="0" smtClean="0"/>
-              <a:t>Repo </a:t>
-            </a:r>
-            <a:r>
-              <a:rPr lang="en-US" sz="1800" dirty="0" smtClean="0"/>
-              <a:t>de la </a:t>
+              <a:t>Repo de la </a:t>
             </a:r>
             <a:r>
               <a:rPr lang="en-US" sz="1800" dirty="0" err="1" smtClean="0"/>
@@ -23251,15 +23289,6 @@
               </a:rPr>
               <a:t>Eventos</a:t>
             </a:r>
-            <a:endParaRPr lang="es-AR" sz="1800" i="0" u="none" strike="noStrike" cap="none" baseline="0" dirty="0" smtClean="0">
-              <a:solidFill>
-                <a:schemeClr val="dk1"/>
-              </a:solidFill>
-              <a:latin typeface="Arial"/>
-              <a:ea typeface="Arial"/>
-              <a:cs typeface="Arial"/>
-              <a:sym typeface="Arial"/>
-            </a:endParaRPr>
           </a:p>
           <a:p>
             <a:r>

</xml_diff>